<commit_message>
légère modification de la présentation du 18-09-2019
</commit_message>
<xml_diff>
--- a/Presentations/septembre/18-09-2019/Présentation.pptx
+++ b/Presentations/septembre/18-09-2019/Présentation.pptx
@@ -208,7 +208,7 @@
           <a:p>
             <a:fld id="{FD8FA38E-94CB-4DB6-9D1F-E14D56FDE638}" type="datetimeFigureOut">
               <a:rPr lang="fr-CA" smtClean="0"/>
-              <a:t>2019-09-16</a:t>
+              <a:t>2019-09-17</a:t>
             </a:fld>
             <a:endParaRPr lang="fr-CA"/>
           </a:p>
@@ -805,7 +805,7 @@
           <a:p>
             <a:fld id="{C9D65F54-2C39-49C3-869E-A4B3EAB778E5}" type="datetimeFigureOut">
               <a:rPr lang="fr-CA" smtClean="0"/>
-              <a:t>2019-09-16</a:t>
+              <a:t>2019-09-17</a:t>
             </a:fld>
             <a:endParaRPr lang="fr-CA"/>
           </a:p>
@@ -1005,7 +1005,7 @@
           <a:p>
             <a:fld id="{C9D65F54-2C39-49C3-869E-A4B3EAB778E5}" type="datetimeFigureOut">
               <a:rPr lang="fr-CA" smtClean="0"/>
-              <a:t>2019-09-16</a:t>
+              <a:t>2019-09-17</a:t>
             </a:fld>
             <a:endParaRPr lang="fr-CA"/>
           </a:p>
@@ -1215,7 +1215,7 @@
           <a:p>
             <a:fld id="{C9D65F54-2C39-49C3-869E-A4B3EAB778E5}" type="datetimeFigureOut">
               <a:rPr lang="fr-CA" smtClean="0"/>
-              <a:t>2019-09-16</a:t>
+              <a:t>2019-09-17</a:t>
             </a:fld>
             <a:endParaRPr lang="fr-CA"/>
           </a:p>
@@ -1415,7 +1415,7 @@
           <a:p>
             <a:fld id="{C9D65F54-2C39-49C3-869E-A4B3EAB778E5}" type="datetimeFigureOut">
               <a:rPr lang="fr-CA" smtClean="0"/>
-              <a:t>2019-09-16</a:t>
+              <a:t>2019-09-17</a:t>
             </a:fld>
             <a:endParaRPr lang="fr-CA"/>
           </a:p>
@@ -1691,7 +1691,7 @@
           <a:p>
             <a:fld id="{C9D65F54-2C39-49C3-869E-A4B3EAB778E5}" type="datetimeFigureOut">
               <a:rPr lang="fr-CA" smtClean="0"/>
-              <a:t>2019-09-16</a:t>
+              <a:t>2019-09-17</a:t>
             </a:fld>
             <a:endParaRPr lang="fr-CA"/>
           </a:p>
@@ -1959,7 +1959,7 @@
           <a:p>
             <a:fld id="{C9D65F54-2C39-49C3-869E-A4B3EAB778E5}" type="datetimeFigureOut">
               <a:rPr lang="fr-CA" smtClean="0"/>
-              <a:t>2019-09-16</a:t>
+              <a:t>2019-09-17</a:t>
             </a:fld>
             <a:endParaRPr lang="fr-CA"/>
           </a:p>
@@ -2374,7 +2374,7 @@
           <a:p>
             <a:fld id="{C9D65F54-2C39-49C3-869E-A4B3EAB778E5}" type="datetimeFigureOut">
               <a:rPr lang="fr-CA" smtClean="0"/>
-              <a:t>2019-09-16</a:t>
+              <a:t>2019-09-17</a:t>
             </a:fld>
             <a:endParaRPr lang="fr-CA"/>
           </a:p>
@@ -2516,7 +2516,7 @@
           <a:p>
             <a:fld id="{C9D65F54-2C39-49C3-869E-A4B3EAB778E5}" type="datetimeFigureOut">
               <a:rPr lang="fr-CA" smtClean="0"/>
-              <a:t>2019-09-16</a:t>
+              <a:t>2019-09-17</a:t>
             </a:fld>
             <a:endParaRPr lang="fr-CA"/>
           </a:p>
@@ -2629,7 +2629,7 @@
           <a:p>
             <a:fld id="{C9D65F54-2C39-49C3-869E-A4B3EAB778E5}" type="datetimeFigureOut">
               <a:rPr lang="fr-CA" smtClean="0"/>
-              <a:t>2019-09-16</a:t>
+              <a:t>2019-09-17</a:t>
             </a:fld>
             <a:endParaRPr lang="fr-CA"/>
           </a:p>
@@ -2942,7 +2942,7 @@
           <a:p>
             <a:fld id="{C9D65F54-2C39-49C3-869E-A4B3EAB778E5}" type="datetimeFigureOut">
               <a:rPr lang="fr-CA" smtClean="0"/>
-              <a:t>2019-09-16</a:t>
+              <a:t>2019-09-17</a:t>
             </a:fld>
             <a:endParaRPr lang="fr-CA"/>
           </a:p>
@@ -3231,7 +3231,7 @@
           <a:p>
             <a:fld id="{C9D65F54-2C39-49C3-869E-A4B3EAB778E5}" type="datetimeFigureOut">
               <a:rPr lang="fr-CA" smtClean="0"/>
-              <a:t>2019-09-16</a:t>
+              <a:t>2019-09-17</a:t>
             </a:fld>
             <a:endParaRPr lang="fr-CA"/>
           </a:p>
@@ -3474,7 +3474,7 @@
           <a:p>
             <a:fld id="{C9D65F54-2C39-49C3-869E-A4B3EAB778E5}" type="datetimeFigureOut">
               <a:rPr lang="fr-CA" smtClean="0"/>
-              <a:t>2019-09-16</a:t>
+              <a:t>2019-09-17</a:t>
             </a:fld>
             <a:endParaRPr lang="fr-CA"/>
           </a:p>
@@ -4579,7 +4579,7 @@
         </p:nvSpPr>
         <p:spPr>
           <a:xfrm>
-            <a:off x="0" y="5295901"/>
+            <a:off x="0" y="5295900"/>
             <a:ext cx="361950" cy="1562100"/>
           </a:xfrm>
           <a:prstGeom prst="actionButtonBlank">

</xml_diff>

<commit_message>
Finalisation de la présentation du 19-09-2019
</commit_message>
<xml_diff>
--- a/Presentations/septembre/18-09-2019/Présentation.pptx
+++ b/Presentations/septembre/18-09-2019/Présentation.pptx
@@ -5,21 +5,19 @@
     <p:sldMasterId id="2147483648" r:id="rId1"/>
   </p:sldMasterIdLst>
   <p:notesMasterIdLst>
-    <p:notesMasterId r:id="rId14"/>
+    <p:notesMasterId r:id="rId12"/>
   </p:notesMasterIdLst>
   <p:sldIdLst>
     <p:sldId id="256" r:id="rId2"/>
     <p:sldId id="267" r:id="rId3"/>
     <p:sldId id="272" r:id="rId4"/>
     <p:sldId id="278" r:id="rId5"/>
-    <p:sldId id="277" r:id="rId6"/>
-    <p:sldId id="276" r:id="rId7"/>
-    <p:sldId id="279" r:id="rId8"/>
-    <p:sldId id="280" r:id="rId9"/>
-    <p:sldId id="273" r:id="rId10"/>
-    <p:sldId id="268" r:id="rId11"/>
-    <p:sldId id="281" r:id="rId12"/>
-    <p:sldId id="282" r:id="rId13"/>
+    <p:sldId id="279" r:id="rId6"/>
+    <p:sldId id="280" r:id="rId7"/>
+    <p:sldId id="273" r:id="rId8"/>
+    <p:sldId id="268" r:id="rId9"/>
+    <p:sldId id="281" r:id="rId10"/>
+    <p:sldId id="282" r:id="rId11"/>
   </p:sldIdLst>
   <p:sldSz cx="12192000" cy="6858000"/>
   <p:notesSz cx="6858000" cy="9144000"/>
@@ -208,7 +206,7 @@
           <a:p>
             <a:fld id="{FD8FA38E-94CB-4DB6-9D1F-E14D56FDE638}" type="datetimeFigureOut">
               <a:rPr lang="fr-CA" smtClean="0"/>
-              <a:t>2019-09-17</a:t>
+              <a:t>2019-09-18</a:t>
             </a:fld>
             <a:endParaRPr lang="fr-CA"/>
           </a:p>
@@ -520,6 +518,18 @@
           <a:bodyPr/>
           <a:lstStyle/>
           <a:p>
+            <a:r>
+              <a:rPr lang="en-CA" dirty="0"/>
+              <a:t>1994 Magellan </a:t>
+            </a:r>
+            <a:r>
+              <a:rPr lang="en-CA" dirty="0" err="1"/>
+              <a:t>Geographix</a:t>
+            </a:r>
+            <a:r>
+              <a:rPr lang="en-CA" dirty="0"/>
+              <a:t> Santa Barbara, CA (800)929-4MAP Robinson Projection</a:t>
+            </a:r>
             <a:endParaRPr lang="fr-CA" dirty="0"/>
           </a:p>
         </p:txBody>
@@ -542,102 +552,6 @@
             <a:fld id="{CDF30879-51EA-4F0B-AB56-EC392D3E121C}" type="slidenum">
               <a:rPr lang="fr-CA" smtClean="0"/>
               <a:t>6</a:t>
-            </a:fld>
-            <a:endParaRPr lang="fr-CA"/>
-          </a:p>
-        </p:txBody>
-      </p:sp>
-    </p:spTree>
-    <p:extLst>
-      <p:ext uri="{BB962C8B-B14F-4D97-AF65-F5344CB8AC3E}">
-        <p14:creationId xmlns:p14="http://schemas.microsoft.com/office/powerpoint/2010/main" val="3058768302"/>
-      </p:ext>
-    </p:extLst>
-  </p:cSld>
-  <p:clrMapOvr>
-    <a:masterClrMapping/>
-  </p:clrMapOvr>
-</p:notes>
-</file>
-
-<file path=ppt/notesSlides/notesSlide2.xml><?xml version="1.0" encoding="utf-8"?>
-<p:notes xmlns:a="http://schemas.openxmlformats.org/drawingml/2006/main" xmlns:r="http://schemas.openxmlformats.org/officeDocument/2006/relationships" xmlns:p="http://schemas.openxmlformats.org/presentationml/2006/main">
-  <p:cSld>
-    <p:spTree>
-      <p:nvGrpSpPr>
-        <p:cNvPr id="1" name=""/>
-        <p:cNvGrpSpPr/>
-        <p:nvPr/>
-      </p:nvGrpSpPr>
-      <p:grpSpPr>
-        <a:xfrm>
-          <a:off x="0" y="0"/>
-          <a:ext cx="0" cy="0"/>
-          <a:chOff x="0" y="0"/>
-          <a:chExt cx="0" cy="0"/>
-        </a:xfrm>
-      </p:grpSpPr>
-      <p:sp>
-        <p:nvSpPr>
-          <p:cNvPr id="2" name="Espace réservé de l'image des diapositives 1"/>
-          <p:cNvSpPr>
-            <a:spLocks noGrp="1" noRot="1" noChangeAspect="1"/>
-          </p:cNvSpPr>
-          <p:nvPr>
-            <p:ph type="sldImg"/>
-          </p:nvPr>
-        </p:nvSpPr>
-        <p:spPr/>
-      </p:sp>
-      <p:sp>
-        <p:nvSpPr>
-          <p:cNvPr id="3" name="Espace réservé des notes 2"/>
-          <p:cNvSpPr>
-            <a:spLocks noGrp="1"/>
-          </p:cNvSpPr>
-          <p:nvPr>
-            <p:ph type="body" idx="1"/>
-          </p:nvPr>
-        </p:nvSpPr>
-        <p:spPr/>
-        <p:txBody>
-          <a:bodyPr/>
-          <a:lstStyle/>
-          <a:p>
-            <a:r>
-              <a:rPr lang="en-CA" dirty="0"/>
-              <a:t>1994 Magellan </a:t>
-            </a:r>
-            <a:r>
-              <a:rPr lang="en-CA" dirty="0" err="1"/>
-              <a:t>Geographix</a:t>
-            </a:r>
-            <a:r>
-              <a:rPr lang="en-CA" dirty="0"/>
-              <a:t> Santa Barbara, CA (800)929-4MAP Robinson Projection</a:t>
-            </a:r>
-            <a:endParaRPr lang="fr-CA" dirty="0"/>
-          </a:p>
-        </p:txBody>
-      </p:sp>
-      <p:sp>
-        <p:nvSpPr>
-          <p:cNvPr id="4" name="Espace réservé du numéro de diapositive 3"/>
-          <p:cNvSpPr>
-            <a:spLocks noGrp="1"/>
-          </p:cNvSpPr>
-          <p:nvPr>
-            <p:ph type="sldNum" sz="quarter" idx="5"/>
-          </p:nvPr>
-        </p:nvSpPr>
-        <p:spPr/>
-        <p:txBody>
-          <a:bodyPr/>
-          <a:lstStyle/>
-          <a:p>
-            <a:fld id="{CDF30879-51EA-4F0B-AB56-EC392D3E121C}" type="slidenum">
-              <a:rPr lang="fr-CA" smtClean="0"/>
-              <a:t>8</a:t>
             </a:fld>
             <a:endParaRPr lang="fr-CA"/>
           </a:p>
@@ -805,7 +719,7 @@
           <a:p>
             <a:fld id="{C9D65F54-2C39-49C3-869E-A4B3EAB778E5}" type="datetimeFigureOut">
               <a:rPr lang="fr-CA" smtClean="0"/>
-              <a:t>2019-09-17</a:t>
+              <a:t>2019-09-18</a:t>
             </a:fld>
             <a:endParaRPr lang="fr-CA"/>
           </a:p>
@@ -1005,7 +919,7 @@
           <a:p>
             <a:fld id="{C9D65F54-2C39-49C3-869E-A4B3EAB778E5}" type="datetimeFigureOut">
               <a:rPr lang="fr-CA" smtClean="0"/>
-              <a:t>2019-09-17</a:t>
+              <a:t>2019-09-18</a:t>
             </a:fld>
             <a:endParaRPr lang="fr-CA"/>
           </a:p>
@@ -1215,7 +1129,7 @@
           <a:p>
             <a:fld id="{C9D65F54-2C39-49C3-869E-A4B3EAB778E5}" type="datetimeFigureOut">
               <a:rPr lang="fr-CA" smtClean="0"/>
-              <a:t>2019-09-17</a:t>
+              <a:t>2019-09-18</a:t>
             </a:fld>
             <a:endParaRPr lang="fr-CA"/>
           </a:p>
@@ -1415,7 +1329,7 @@
           <a:p>
             <a:fld id="{C9D65F54-2C39-49C3-869E-A4B3EAB778E5}" type="datetimeFigureOut">
               <a:rPr lang="fr-CA" smtClean="0"/>
-              <a:t>2019-09-17</a:t>
+              <a:t>2019-09-18</a:t>
             </a:fld>
             <a:endParaRPr lang="fr-CA"/>
           </a:p>
@@ -1691,7 +1605,7 @@
           <a:p>
             <a:fld id="{C9D65F54-2C39-49C3-869E-A4B3EAB778E5}" type="datetimeFigureOut">
               <a:rPr lang="fr-CA" smtClean="0"/>
-              <a:t>2019-09-17</a:t>
+              <a:t>2019-09-18</a:t>
             </a:fld>
             <a:endParaRPr lang="fr-CA"/>
           </a:p>
@@ -1959,7 +1873,7 @@
           <a:p>
             <a:fld id="{C9D65F54-2C39-49C3-869E-A4B3EAB778E5}" type="datetimeFigureOut">
               <a:rPr lang="fr-CA" smtClean="0"/>
-              <a:t>2019-09-17</a:t>
+              <a:t>2019-09-18</a:t>
             </a:fld>
             <a:endParaRPr lang="fr-CA"/>
           </a:p>
@@ -2374,7 +2288,7 @@
           <a:p>
             <a:fld id="{C9D65F54-2C39-49C3-869E-A4B3EAB778E5}" type="datetimeFigureOut">
               <a:rPr lang="fr-CA" smtClean="0"/>
-              <a:t>2019-09-17</a:t>
+              <a:t>2019-09-18</a:t>
             </a:fld>
             <a:endParaRPr lang="fr-CA"/>
           </a:p>
@@ -2516,7 +2430,7 @@
           <a:p>
             <a:fld id="{C9D65F54-2C39-49C3-869E-A4B3EAB778E5}" type="datetimeFigureOut">
               <a:rPr lang="fr-CA" smtClean="0"/>
-              <a:t>2019-09-17</a:t>
+              <a:t>2019-09-18</a:t>
             </a:fld>
             <a:endParaRPr lang="fr-CA"/>
           </a:p>
@@ -2629,7 +2543,7 @@
           <a:p>
             <a:fld id="{C9D65F54-2C39-49C3-869E-A4B3EAB778E5}" type="datetimeFigureOut">
               <a:rPr lang="fr-CA" smtClean="0"/>
-              <a:t>2019-09-17</a:t>
+              <a:t>2019-09-18</a:t>
             </a:fld>
             <a:endParaRPr lang="fr-CA"/>
           </a:p>
@@ -2942,7 +2856,7 @@
           <a:p>
             <a:fld id="{C9D65F54-2C39-49C3-869E-A4B3EAB778E5}" type="datetimeFigureOut">
               <a:rPr lang="fr-CA" smtClean="0"/>
-              <a:t>2019-09-17</a:t>
+              <a:t>2019-09-18</a:t>
             </a:fld>
             <a:endParaRPr lang="fr-CA"/>
           </a:p>
@@ -3231,7 +3145,7 @@
           <a:p>
             <a:fld id="{C9D65F54-2C39-49C3-869E-A4B3EAB778E5}" type="datetimeFigureOut">
               <a:rPr lang="fr-CA" smtClean="0"/>
-              <a:t>2019-09-17</a:t>
+              <a:t>2019-09-18</a:t>
             </a:fld>
             <a:endParaRPr lang="fr-CA"/>
           </a:p>
@@ -3474,7 +3388,7 @@
           <a:p>
             <a:fld id="{C9D65F54-2C39-49C3-869E-A4B3EAB778E5}" type="datetimeFigureOut">
               <a:rPr lang="fr-CA" smtClean="0"/>
-              <a:t>2019-09-17</a:t>
+              <a:t>2019-09-18</a:t>
             </a:fld>
             <a:endParaRPr lang="fr-CA"/>
           </a:p>
@@ -4299,362 +4213,6 @@
           <a:chExt cx="0" cy="0"/>
         </a:xfrm>
       </p:grpSpPr>
-      <p:pic>
-        <p:nvPicPr>
-          <p:cNvPr id="6" name="Espace réservé du contenu 5">
-            <a:extLst>
-              <a:ext uri="{FF2B5EF4-FFF2-40B4-BE49-F238E27FC236}">
-                <a16:creationId xmlns:a16="http://schemas.microsoft.com/office/drawing/2014/main" id="{0C5BAD85-16AE-4B0A-8D19-2638CA70C242}"/>
-              </a:ext>
-            </a:extLst>
-          </p:cNvPr>
-          <p:cNvPicPr>
-            <a:picLocks noGrp="1" noChangeAspect="1"/>
-          </p:cNvPicPr>
-          <p:nvPr>
-            <p:ph idx="1"/>
-          </p:nvPr>
-        </p:nvPicPr>
-        <p:blipFill>
-          <a:blip r:embed="rId2">
-            <a:extLst>
-              <a:ext uri="{28A0092B-C50C-407E-A947-70E740481C1C}">
-                <a14:useLocalDpi xmlns:a14="http://schemas.microsoft.com/office/drawing/2010/main" val="0"/>
-              </a:ext>
-            </a:extLst>
-          </a:blip>
-          <a:stretch>
-            <a:fillRect/>
-          </a:stretch>
-        </p:blipFill>
-        <p:spPr>
-          <a:xfrm>
-            <a:off x="3239043" y="643466"/>
-            <a:ext cx="5713914" cy="5571067"/>
-          </a:xfrm>
-          <a:prstGeom prst="rect">
-            <a:avLst/>
-          </a:prstGeom>
-        </p:spPr>
-      </p:pic>
-    </p:spTree>
-    <p:extLst>
-      <p:ext uri="{BB962C8B-B14F-4D97-AF65-F5344CB8AC3E}">
-        <p14:creationId xmlns:p14="http://schemas.microsoft.com/office/powerpoint/2010/main" val="3990056866"/>
-      </p:ext>
-    </p:extLst>
-  </p:cSld>
-  <p:clrMapOvr>
-    <a:masterClrMapping/>
-  </p:clrMapOvr>
-</p:sld>
-</file>
-
-<file path=ppt/slides/slide11.xml><?xml version="1.0" encoding="utf-8"?>
-<p:sld xmlns:a="http://schemas.openxmlformats.org/drawingml/2006/main" xmlns:r="http://schemas.openxmlformats.org/officeDocument/2006/relationships" xmlns:p="http://schemas.openxmlformats.org/presentationml/2006/main">
-  <p:cSld>
-    <p:bg>
-      <p:bgPr>
-        <a:solidFill>
-          <a:schemeClr val="bg1"/>
-        </a:solidFill>
-        <a:effectLst/>
-      </p:bgPr>
-    </p:bg>
-    <p:spTree>
-      <p:nvGrpSpPr>
-        <p:cNvPr id="1" name=""/>
-        <p:cNvGrpSpPr/>
-        <p:nvPr/>
-      </p:nvGrpSpPr>
-      <p:grpSpPr>
-        <a:xfrm>
-          <a:off x="0" y="0"/>
-          <a:ext cx="0" cy="0"/>
-          <a:chOff x="0" y="0"/>
-          <a:chExt cx="0" cy="0"/>
-        </a:xfrm>
-      </p:grpSpPr>
-      <p:sp>
-        <p:nvSpPr>
-          <p:cNvPr id="4" name="Rectangle 3">
-            <a:extLst>
-              <a:ext uri="{FF2B5EF4-FFF2-40B4-BE49-F238E27FC236}">
-                <a16:creationId xmlns:a16="http://schemas.microsoft.com/office/drawing/2014/main" id="{4DD5D21D-F3EA-445D-AADB-6D03693C87C0}"/>
-              </a:ext>
-            </a:extLst>
-          </p:cNvPr>
-          <p:cNvSpPr/>
-          <p:nvPr/>
-        </p:nvSpPr>
-        <p:spPr>
-          <a:xfrm>
-            <a:off x="457200" y="314325"/>
-            <a:ext cx="11277600" cy="6229350"/>
-          </a:xfrm>
-          <a:prstGeom prst="rect">
-            <a:avLst/>
-          </a:prstGeom>
-          <a:noFill/>
-          <a:ln>
-            <a:solidFill>
-              <a:schemeClr val="tx1"/>
-            </a:solidFill>
-          </a:ln>
-        </p:spPr>
-        <p:style>
-          <a:lnRef idx="2">
-            <a:schemeClr val="accent1">
-              <a:shade val="50000"/>
-            </a:schemeClr>
-          </a:lnRef>
-          <a:fillRef idx="1">
-            <a:schemeClr val="accent1"/>
-          </a:fillRef>
-          <a:effectRef idx="0">
-            <a:schemeClr val="accent1"/>
-          </a:effectRef>
-          <a:fontRef idx="minor">
-            <a:schemeClr val="lt1"/>
-          </a:fontRef>
-        </p:style>
-        <p:txBody>
-          <a:bodyPr rtlCol="0" anchor="ctr"/>
-          <a:lstStyle/>
-          <a:p>
-            <a:pPr algn="ctr"/>
-            <a:endParaRPr lang="fr-CA"/>
-          </a:p>
-        </p:txBody>
-      </p:sp>
-      <p:sp>
-        <p:nvSpPr>
-          <p:cNvPr id="5" name="Rectangle 4">
-            <a:extLst>
-              <a:ext uri="{FF2B5EF4-FFF2-40B4-BE49-F238E27FC236}">
-                <a16:creationId xmlns:a16="http://schemas.microsoft.com/office/drawing/2014/main" id="{F2252435-55BF-4212-AFD5-F140C9B01DE8}"/>
-              </a:ext>
-            </a:extLst>
-          </p:cNvPr>
-          <p:cNvSpPr/>
-          <p:nvPr/>
-        </p:nvSpPr>
-        <p:spPr>
-          <a:xfrm>
-            <a:off x="457200" y="314325"/>
-            <a:ext cx="11277600" cy="733425"/>
-          </a:xfrm>
-          <a:prstGeom prst="rect">
-            <a:avLst/>
-          </a:prstGeom>
-          <a:noFill/>
-          <a:ln>
-            <a:solidFill>
-              <a:schemeClr val="tx1"/>
-            </a:solidFill>
-          </a:ln>
-        </p:spPr>
-        <p:style>
-          <a:lnRef idx="2">
-            <a:schemeClr val="accent1">
-              <a:shade val="50000"/>
-            </a:schemeClr>
-          </a:lnRef>
-          <a:fillRef idx="1">
-            <a:schemeClr val="accent1"/>
-          </a:fillRef>
-          <a:effectRef idx="0">
-            <a:schemeClr val="accent1"/>
-          </a:effectRef>
-          <a:fontRef idx="minor">
-            <a:schemeClr val="lt1"/>
-          </a:fontRef>
-        </p:style>
-        <p:txBody>
-          <a:bodyPr rtlCol="0" anchor="ctr"/>
-          <a:lstStyle/>
-          <a:p>
-            <a:pPr algn="ctr"/>
-            <a:endParaRPr lang="fr-CA" dirty="0"/>
-          </a:p>
-        </p:txBody>
-      </p:sp>
-      <p:sp>
-        <p:nvSpPr>
-          <p:cNvPr id="7" name="ZoneTexte 6">
-            <a:extLst>
-              <a:ext uri="{FF2B5EF4-FFF2-40B4-BE49-F238E27FC236}">
-                <a16:creationId xmlns:a16="http://schemas.microsoft.com/office/drawing/2014/main" id="{D700CEFB-9D8C-4C37-93C9-A9B38A0C1EEE}"/>
-              </a:ext>
-            </a:extLst>
-          </p:cNvPr>
-          <p:cNvSpPr txBox="1"/>
-          <p:nvPr/>
-        </p:nvSpPr>
-        <p:spPr>
-          <a:xfrm>
-            <a:off x="4848224" y="496371"/>
-            <a:ext cx="2495551" cy="369332"/>
-          </a:xfrm>
-          <a:prstGeom prst="rect">
-            <a:avLst/>
-          </a:prstGeom>
-          <a:noFill/>
-        </p:spPr>
-        <p:txBody>
-          <a:bodyPr wrap="square" rtlCol="0">
-            <a:spAutoFit/>
-          </a:bodyPr>
-          <a:lstStyle/>
-          <a:p>
-            <a:r>
-              <a:rPr lang="en-CA" dirty="0"/>
-              <a:t>Consultation des </a:t>
-            </a:r>
-            <a:r>
-              <a:rPr lang="en-CA" dirty="0" err="1"/>
-              <a:t>bouées</a:t>
-            </a:r>
-            <a:endParaRPr lang="fr-CA" dirty="0"/>
-          </a:p>
-        </p:txBody>
-      </p:sp>
-      <p:pic>
-        <p:nvPicPr>
-          <p:cNvPr id="1026" name="Picture 2" descr="Résultats de recherche d'images pour « logo home »">
-            <a:extLst>
-              <a:ext uri="{FF2B5EF4-FFF2-40B4-BE49-F238E27FC236}">
-                <a16:creationId xmlns:a16="http://schemas.microsoft.com/office/drawing/2014/main" id="{BE53146C-6811-450E-B394-6EF28ABF8786}"/>
-              </a:ext>
-            </a:extLst>
-          </p:cNvPr>
-          <p:cNvPicPr>
-            <a:picLocks noChangeAspect="1" noChangeArrowheads="1"/>
-          </p:cNvPicPr>
-          <p:nvPr/>
-        </p:nvPicPr>
-        <p:blipFill rotWithShape="1">
-          <a:blip r:embed="rId2">
-            <a:extLst>
-              <a:ext uri="{28A0092B-C50C-407E-A947-70E740481C1C}">
-                <a14:useLocalDpi xmlns:a14="http://schemas.microsoft.com/office/drawing/2010/main" val="0"/>
-              </a:ext>
-            </a:extLst>
-          </a:blip>
-          <a:srcRect l="15254" t="12995" r="14689" b="14124"/>
-          <a:stretch/>
-        </p:blipFill>
-        <p:spPr bwMode="auto">
-          <a:xfrm>
-            <a:off x="933450" y="403583"/>
-            <a:ext cx="533400" cy="554908"/>
-          </a:xfrm>
-          <a:prstGeom prst="rect">
-            <a:avLst/>
-          </a:prstGeom>
-          <a:noFill/>
-          <a:extLst>
-            <a:ext uri="{909E8E84-426E-40DD-AFC4-6F175D3DCCD1}">
-              <a14:hiddenFill xmlns:a14="http://schemas.microsoft.com/office/drawing/2010/main">
-                <a:solidFill>
-                  <a:srgbClr val="FFFFFF"/>
-                </a:solidFill>
-              </a14:hiddenFill>
-            </a:ext>
-          </a:extLst>
-        </p:spPr>
-      </p:pic>
-      <p:sp>
-        <p:nvSpPr>
-          <p:cNvPr id="9" name="Bouton d’action : vide 8">
-            <a:hlinkClick r:id="rId3" action="ppaction://hlinksldjump" highlightClick="1"/>
-            <a:extLst>
-              <a:ext uri="{FF2B5EF4-FFF2-40B4-BE49-F238E27FC236}">
-                <a16:creationId xmlns:a16="http://schemas.microsoft.com/office/drawing/2014/main" id="{FC930852-8F4B-4280-9AA8-7D8ADB87FEF9}"/>
-              </a:ext>
-            </a:extLst>
-          </p:cNvPr>
-          <p:cNvSpPr/>
-          <p:nvPr/>
-        </p:nvSpPr>
-        <p:spPr>
-          <a:xfrm>
-            <a:off x="0" y="5295900"/>
-            <a:ext cx="361950" cy="1562100"/>
-          </a:xfrm>
-          <a:prstGeom prst="actionButtonBlank">
-            <a:avLst/>
-          </a:prstGeom>
-          <a:noFill/>
-          <a:ln>
-            <a:solidFill>
-              <a:schemeClr val="bg1"/>
-            </a:solidFill>
-          </a:ln>
-        </p:spPr>
-        <p:style>
-          <a:lnRef idx="2">
-            <a:schemeClr val="accent1">
-              <a:shade val="50000"/>
-            </a:schemeClr>
-          </a:lnRef>
-          <a:fillRef idx="1">
-            <a:schemeClr val="accent1"/>
-          </a:fillRef>
-          <a:effectRef idx="0">
-            <a:schemeClr val="accent1"/>
-          </a:effectRef>
-          <a:fontRef idx="minor">
-            <a:schemeClr val="lt1"/>
-          </a:fontRef>
-        </p:style>
-        <p:txBody>
-          <a:bodyPr rtlCol="0" anchor="ctr"/>
-          <a:lstStyle/>
-          <a:p>
-            <a:pPr algn="ctr"/>
-            <a:endParaRPr lang="fr-CA" dirty="0"/>
-          </a:p>
-        </p:txBody>
-      </p:sp>
-    </p:spTree>
-    <p:extLst>
-      <p:ext uri="{BB962C8B-B14F-4D97-AF65-F5344CB8AC3E}">
-        <p14:creationId xmlns:p14="http://schemas.microsoft.com/office/powerpoint/2010/main" val="1086254278"/>
-      </p:ext>
-    </p:extLst>
-  </p:cSld>
-  <p:clrMapOvr>
-    <a:masterClrMapping/>
-  </p:clrMapOvr>
-</p:sld>
-</file>
-
-<file path=ppt/slides/slide12.xml><?xml version="1.0" encoding="utf-8"?>
-<p:sld xmlns:a="http://schemas.openxmlformats.org/drawingml/2006/main" xmlns:r="http://schemas.openxmlformats.org/officeDocument/2006/relationships" xmlns:p="http://schemas.openxmlformats.org/presentationml/2006/main">
-  <p:cSld>
-    <p:bg>
-      <p:bgPr>
-        <a:solidFill>
-          <a:schemeClr val="bg1"/>
-        </a:solidFill>
-        <a:effectLst/>
-      </p:bgPr>
-    </p:bg>
-    <p:spTree>
-      <p:nvGrpSpPr>
-        <p:cNvPr id="1" name=""/>
-        <p:cNvGrpSpPr/>
-        <p:nvPr/>
-      </p:nvGrpSpPr>
-      <p:grpSpPr>
-        <a:xfrm>
-          <a:off x="0" y="0"/>
-          <a:ext cx="0" cy="0"/>
-          <a:chOff x="0" y="0"/>
-          <a:chExt cx="0" cy="0"/>
-        </a:xfrm>
-      </p:grpSpPr>
       <p:sp>
         <p:nvSpPr>
           <p:cNvPr id="4" name="Rectangle 3">
@@ -5532,7 +5090,7 @@
         </p:nvSpPr>
         <p:spPr>
           <a:xfrm>
-            <a:off x="805543" y="377114"/>
+            <a:off x="805543" y="804335"/>
             <a:ext cx="5006336" cy="1325563"/>
           </a:xfrm>
         </p:spPr>
@@ -5567,8 +5125,8 @@
         </p:nvSpPr>
         <p:spPr>
           <a:xfrm>
-            <a:off x="985421" y="1885950"/>
-            <a:ext cx="4826458" cy="4167716"/>
+            <a:off x="985421" y="2571750"/>
+            <a:ext cx="4826458" cy="3481915"/>
           </a:xfrm>
         </p:spPr>
         <p:txBody>
@@ -5588,20 +5146,6 @@
             <a:r>
               <a:rPr lang="en-US" sz="2400" dirty="0" err="1"/>
               <a:t>demandées</a:t>
-            </a:r>
-            <a:endParaRPr lang="en-US" sz="2400" dirty="0"/>
-          </a:p>
-          <a:p>
-            <a:endParaRPr lang="en-US" sz="2400" dirty="0"/>
-          </a:p>
-          <a:p>
-            <a:r>
-              <a:rPr lang="en-US" sz="2400" dirty="0"/>
-              <a:t>Sprint de la </a:t>
-            </a:r>
-            <a:r>
-              <a:rPr lang="en-US" sz="2400" dirty="0" err="1"/>
-              <a:t>semaine</a:t>
             </a:r>
             <a:endParaRPr lang="en-US" sz="2400" dirty="0"/>
           </a:p>
@@ -6738,8 +6282,8 @@
         </p:nvSpPr>
         <p:spPr>
           <a:xfrm>
-            <a:off x="420099" y="3225089"/>
-            <a:ext cx="6172782" cy="1325563"/>
+            <a:off x="1085849" y="3225089"/>
+            <a:ext cx="5507031" cy="1325563"/>
           </a:xfrm>
         </p:spPr>
         <p:txBody>
@@ -6750,7 +6294,7 @@
           <a:p>
             <a:r>
               <a:rPr lang="fr-FR" dirty="0"/>
-              <a:t>Sprint de la semaine</a:t>
+              <a:t>Questions</a:t>
             </a:r>
           </a:p>
         </p:txBody>
@@ -7031,7 +6575,7 @@
     </p:spTree>
     <p:extLst>
       <p:ext uri="{BB962C8B-B14F-4D97-AF65-F5344CB8AC3E}">
-        <p14:creationId xmlns:p14="http://schemas.microsoft.com/office/powerpoint/2010/main" val="2581054204"/>
+        <p14:creationId xmlns:p14="http://schemas.microsoft.com/office/powerpoint/2010/main" val="3377858594"/>
       </p:ext>
     </p:extLst>
   </p:cSld>
@@ -7058,10 +6602,98 @@
           <a:chExt cx="0" cy="0"/>
         </a:xfrm>
       </p:grpSpPr>
+      <p:pic>
+        <p:nvPicPr>
+          <p:cNvPr id="3" name="Image 2">
+            <a:extLst>
+              <a:ext uri="{FF2B5EF4-FFF2-40B4-BE49-F238E27FC236}">
+                <a16:creationId xmlns:a16="http://schemas.microsoft.com/office/drawing/2014/main" id="{660B921A-5B53-4579-838F-8C4BA71ED4F2}"/>
+              </a:ext>
+            </a:extLst>
+          </p:cNvPr>
+          <p:cNvPicPr>
+            <a:picLocks noChangeAspect="1"/>
+          </p:cNvPicPr>
+          <p:nvPr/>
+        </p:nvPicPr>
+        <p:blipFill rotWithShape="1">
+          <a:blip r:embed="rId3">
+            <a:extLst>
+              <a:ext uri="{28A0092B-C50C-407E-A947-70E740481C1C}">
+                <a14:useLocalDpi xmlns:a14="http://schemas.microsoft.com/office/drawing/2010/main" val="0"/>
+              </a:ext>
+            </a:extLst>
+          </a:blip>
+          <a:srcRect b="6187"/>
+          <a:stretch/>
+        </p:blipFill>
+        <p:spPr>
+          <a:xfrm>
+            <a:off x="0" y="237173"/>
+            <a:ext cx="12192000" cy="6383655"/>
+          </a:xfrm>
+          <a:prstGeom prst="rect">
+            <a:avLst/>
+          </a:prstGeom>
+        </p:spPr>
+      </p:pic>
+      <p:sp>
+        <p:nvSpPr>
+          <p:cNvPr id="4" name="Bouton d’action : vide 3">
+            <a:hlinkClick r:id="rId4" action="ppaction://hlinksldjump" highlightClick="1"/>
+            <a:extLst>
+              <a:ext uri="{FF2B5EF4-FFF2-40B4-BE49-F238E27FC236}">
+                <a16:creationId xmlns:a16="http://schemas.microsoft.com/office/drawing/2014/main" id="{B88DC8D6-31FF-49E9-B8FB-66BB464466B5}"/>
+              </a:ext>
+            </a:extLst>
+          </p:cNvPr>
+          <p:cNvSpPr/>
+          <p:nvPr/>
+        </p:nvSpPr>
+        <p:spPr>
+          <a:xfrm>
+            <a:off x="0" y="5934075"/>
+            <a:ext cx="1314450" cy="923925"/>
+          </a:xfrm>
+          <a:prstGeom prst="actionButtonBlank">
+            <a:avLst/>
+          </a:prstGeom>
+          <a:noFill/>
+          <a:ln>
+            <a:solidFill>
+              <a:schemeClr val="bg1"/>
+            </a:solidFill>
+          </a:ln>
+        </p:spPr>
+        <p:style>
+          <a:lnRef idx="2">
+            <a:schemeClr val="accent1">
+              <a:shade val="50000"/>
+            </a:schemeClr>
+          </a:lnRef>
+          <a:fillRef idx="1">
+            <a:schemeClr val="accent1"/>
+          </a:fillRef>
+          <a:effectRef idx="0">
+            <a:schemeClr val="accent1"/>
+          </a:effectRef>
+          <a:fontRef idx="minor">
+            <a:schemeClr val="lt1"/>
+          </a:fontRef>
+        </p:style>
+        <p:txBody>
+          <a:bodyPr rtlCol="0" anchor="ctr"/>
+          <a:lstStyle/>
+          <a:p>
+            <a:pPr algn="ctr"/>
+            <a:endParaRPr lang="fr-CA"/>
+          </a:p>
+        </p:txBody>
+      </p:sp>
     </p:spTree>
     <p:extLst>
       <p:ext uri="{BB962C8B-B14F-4D97-AF65-F5344CB8AC3E}">
-        <p14:creationId xmlns:p14="http://schemas.microsoft.com/office/powerpoint/2010/main" val="882902949"/>
+        <p14:creationId xmlns:p14="http://schemas.microsoft.com/office/powerpoint/2010/main" val="3985844982"/>
       </p:ext>
     </p:extLst>
   </p:cSld>
@@ -7117,8 +6749,8 @@
         </p:nvSpPr>
         <p:spPr>
           <a:xfrm>
-            <a:off x="1085849" y="3225089"/>
-            <a:ext cx="5507031" cy="1325563"/>
+            <a:off x="420099" y="3225089"/>
+            <a:ext cx="6172782" cy="1325563"/>
           </a:xfrm>
         </p:spPr>
         <p:txBody>
@@ -7128,9 +6760,18 @@
           <a:lstStyle/>
           <a:p>
             <a:r>
-              <a:rPr lang="fr-FR" dirty="0"/>
-              <a:t>Questions</a:t>
-            </a:r>
+              <a:rPr lang="fr-FR" dirty="0">
+                <a:hlinkClick r:id="rId2">
+                  <a:extLst>
+                    <a:ext uri="{A12FA001-AC4F-418D-AE19-62706E023703}">
+                      <ahyp:hlinkClr xmlns:ahyp="http://schemas.microsoft.com/office/drawing/2018/hyperlinkcolor" val="tx"/>
+                    </a:ext>
+                  </a:extLst>
+                </a:hlinkClick>
+              </a:rPr>
+              <a:t>Démonstration</a:t>
+            </a:r>
+            <a:endParaRPr lang="fr-FR" dirty="0"/>
           </a:p>
         </p:txBody>
       </p:sp>
@@ -7316,482 +6957,6 @@
           <p:nvPr/>
         </p:nvPicPr>
         <p:blipFill rotWithShape="1">
-          <a:blip r:embed="rId2">
-            <a:extLst>
-              <a:ext uri="{28A0092B-C50C-407E-A947-70E740481C1C}">
-                <a14:useLocalDpi xmlns:a14="http://schemas.microsoft.com/office/drawing/2010/main" val="0"/>
-              </a:ext>
-            </a:extLst>
-          </a:blip>
-          <a:srcRect l="10488" r="3868" b="2"/>
-          <a:stretch/>
-        </p:blipFill>
-        <p:spPr>
-          <a:xfrm>
-            <a:off x="6167846" y="10"/>
-            <a:ext cx="6024154" cy="6857990"/>
-          </a:xfrm>
-          <a:custGeom>
-            <a:avLst/>
-            <a:gdLst>
-              <a:gd name="connsiteX0" fmla="*/ 70374 w 6024154"/>
-              <a:gd name="connsiteY0" fmla="*/ 0 h 6858000"/>
-              <a:gd name="connsiteX1" fmla="*/ 6024154 w 6024154"/>
-              <a:gd name="connsiteY1" fmla="*/ 0 h 6858000"/>
-              <a:gd name="connsiteX2" fmla="*/ 6024154 w 6024154"/>
-              <a:gd name="connsiteY2" fmla="*/ 6858000 h 6858000"/>
-              <a:gd name="connsiteX3" fmla="*/ 3587167 w 6024154"/>
-              <a:gd name="connsiteY3" fmla="*/ 6858000 h 6858000"/>
-              <a:gd name="connsiteX4" fmla="*/ 3474220 w 6024154"/>
-              <a:gd name="connsiteY4" fmla="*/ 6800152 h 6858000"/>
-              <a:gd name="connsiteX5" fmla="*/ 0 w 6024154"/>
-              <a:gd name="connsiteY5" fmla="*/ 962844 h 6858000"/>
-              <a:gd name="connsiteX6" fmla="*/ 34274 w 6024154"/>
-              <a:gd name="connsiteY6" fmla="*/ 284091 h 6858000"/>
-            </a:gdLst>
-            <a:ahLst/>
-            <a:cxnLst>
-              <a:cxn ang="0">
-                <a:pos x="connsiteX0" y="connsiteY0"/>
-              </a:cxn>
-              <a:cxn ang="0">
-                <a:pos x="connsiteX1" y="connsiteY1"/>
-              </a:cxn>
-              <a:cxn ang="0">
-                <a:pos x="connsiteX2" y="connsiteY2"/>
-              </a:cxn>
-              <a:cxn ang="0">
-                <a:pos x="connsiteX3" y="connsiteY3"/>
-              </a:cxn>
-              <a:cxn ang="0">
-                <a:pos x="connsiteX4" y="connsiteY4"/>
-              </a:cxn>
-              <a:cxn ang="0">
-                <a:pos x="connsiteX5" y="connsiteY5"/>
-              </a:cxn>
-              <a:cxn ang="0">
-                <a:pos x="connsiteX6" y="connsiteY6"/>
-              </a:cxn>
-            </a:cxnLst>
-            <a:rect l="l" t="t" r="r" b="b"/>
-            <a:pathLst>
-              <a:path w="6024154" h="6858000">
-                <a:moveTo>
-                  <a:pt x="70374" y="0"/>
-                </a:moveTo>
-                <a:lnTo>
-                  <a:pt x="6024154" y="0"/>
-                </a:lnTo>
-                <a:lnTo>
-                  <a:pt x="6024154" y="6858000"/>
-                </a:lnTo>
-                <a:lnTo>
-                  <a:pt x="3587167" y="6858000"/>
-                </a:lnTo>
-                <a:lnTo>
-                  <a:pt x="3474220" y="6800152"/>
-                </a:lnTo>
-                <a:cubicBezTo>
-                  <a:pt x="1404818" y="5675986"/>
-                  <a:pt x="0" y="3483472"/>
-                  <a:pt x="0" y="962844"/>
-                </a:cubicBezTo>
-                <a:cubicBezTo>
-                  <a:pt x="0" y="733696"/>
-                  <a:pt x="11610" y="507260"/>
-                  <a:pt x="34274" y="284091"/>
-                </a:cubicBezTo>
-                <a:close/>
-              </a:path>
-            </a:pathLst>
-          </a:custGeom>
-        </p:spPr>
-      </p:pic>
-    </p:spTree>
-    <p:extLst>
-      <p:ext uri="{BB962C8B-B14F-4D97-AF65-F5344CB8AC3E}">
-        <p14:creationId xmlns:p14="http://schemas.microsoft.com/office/powerpoint/2010/main" val="3377858594"/>
-      </p:ext>
-    </p:extLst>
-  </p:cSld>
-  <p:clrMapOvr>
-    <a:overrideClrMapping bg1="dk1" tx1="lt1" bg2="dk2" tx2="lt2" accent1="accent1" accent2="accent2" accent3="accent3" accent4="accent4" accent5="accent5" accent6="accent6" hlink="hlink" folHlink="folHlink"/>
-  </p:clrMapOvr>
-</p:sld>
-</file>
-
-<file path=ppt/slides/slide8.xml><?xml version="1.0" encoding="utf-8"?>
-<p:sld xmlns:a="http://schemas.openxmlformats.org/drawingml/2006/main" xmlns:r="http://schemas.openxmlformats.org/officeDocument/2006/relationships" xmlns:p="http://schemas.openxmlformats.org/presentationml/2006/main">
-  <p:cSld>
-    <p:spTree>
-      <p:nvGrpSpPr>
-        <p:cNvPr id="1" name=""/>
-        <p:cNvGrpSpPr/>
-        <p:nvPr/>
-      </p:nvGrpSpPr>
-      <p:grpSpPr>
-        <a:xfrm>
-          <a:off x="0" y="0"/>
-          <a:ext cx="0" cy="0"/>
-          <a:chOff x="0" y="0"/>
-          <a:chExt cx="0" cy="0"/>
-        </a:xfrm>
-      </p:grpSpPr>
-      <p:pic>
-        <p:nvPicPr>
-          <p:cNvPr id="3" name="Image 2">
-            <a:extLst>
-              <a:ext uri="{FF2B5EF4-FFF2-40B4-BE49-F238E27FC236}">
-                <a16:creationId xmlns:a16="http://schemas.microsoft.com/office/drawing/2014/main" id="{660B921A-5B53-4579-838F-8C4BA71ED4F2}"/>
-              </a:ext>
-            </a:extLst>
-          </p:cNvPr>
-          <p:cNvPicPr>
-            <a:picLocks noChangeAspect="1"/>
-          </p:cNvPicPr>
-          <p:nvPr/>
-        </p:nvPicPr>
-        <p:blipFill rotWithShape="1">
-          <a:blip r:embed="rId3">
-            <a:extLst>
-              <a:ext uri="{28A0092B-C50C-407E-A947-70E740481C1C}">
-                <a14:useLocalDpi xmlns:a14="http://schemas.microsoft.com/office/drawing/2010/main" val="0"/>
-              </a:ext>
-            </a:extLst>
-          </a:blip>
-          <a:srcRect b="6187"/>
-          <a:stretch/>
-        </p:blipFill>
-        <p:spPr>
-          <a:xfrm>
-            <a:off x="0" y="237173"/>
-            <a:ext cx="12192000" cy="6383655"/>
-          </a:xfrm>
-          <a:prstGeom prst="rect">
-            <a:avLst/>
-          </a:prstGeom>
-        </p:spPr>
-      </p:pic>
-      <p:sp>
-        <p:nvSpPr>
-          <p:cNvPr id="4" name="Bouton d’action : vide 3">
-            <a:hlinkClick r:id="rId4" action="ppaction://hlinksldjump" highlightClick="1"/>
-            <a:extLst>
-              <a:ext uri="{FF2B5EF4-FFF2-40B4-BE49-F238E27FC236}">
-                <a16:creationId xmlns:a16="http://schemas.microsoft.com/office/drawing/2014/main" id="{B88DC8D6-31FF-49E9-B8FB-66BB464466B5}"/>
-              </a:ext>
-            </a:extLst>
-          </p:cNvPr>
-          <p:cNvSpPr/>
-          <p:nvPr/>
-        </p:nvSpPr>
-        <p:spPr>
-          <a:xfrm>
-            <a:off x="0" y="5934075"/>
-            <a:ext cx="1314450" cy="923925"/>
-          </a:xfrm>
-          <a:prstGeom prst="actionButtonBlank">
-            <a:avLst/>
-          </a:prstGeom>
-          <a:noFill/>
-          <a:ln>
-            <a:solidFill>
-              <a:schemeClr val="bg1"/>
-            </a:solidFill>
-          </a:ln>
-        </p:spPr>
-        <p:style>
-          <a:lnRef idx="2">
-            <a:schemeClr val="accent1">
-              <a:shade val="50000"/>
-            </a:schemeClr>
-          </a:lnRef>
-          <a:fillRef idx="1">
-            <a:schemeClr val="accent1"/>
-          </a:fillRef>
-          <a:effectRef idx="0">
-            <a:schemeClr val="accent1"/>
-          </a:effectRef>
-          <a:fontRef idx="minor">
-            <a:schemeClr val="lt1"/>
-          </a:fontRef>
-        </p:style>
-        <p:txBody>
-          <a:bodyPr rtlCol="0" anchor="ctr"/>
-          <a:lstStyle/>
-          <a:p>
-            <a:pPr algn="ctr"/>
-            <a:endParaRPr lang="fr-CA"/>
-          </a:p>
-        </p:txBody>
-      </p:sp>
-    </p:spTree>
-    <p:extLst>
-      <p:ext uri="{BB962C8B-B14F-4D97-AF65-F5344CB8AC3E}">
-        <p14:creationId xmlns:p14="http://schemas.microsoft.com/office/powerpoint/2010/main" val="3985844982"/>
-      </p:ext>
-    </p:extLst>
-  </p:cSld>
-  <p:clrMapOvr>
-    <a:masterClrMapping/>
-  </p:clrMapOvr>
-</p:sld>
-</file>
-
-<file path=ppt/slides/slide9.xml><?xml version="1.0" encoding="utf-8"?>
-<p:sld xmlns:a="http://schemas.openxmlformats.org/drawingml/2006/main" xmlns:r="http://schemas.openxmlformats.org/officeDocument/2006/relationships" xmlns:p="http://schemas.openxmlformats.org/presentationml/2006/main">
-  <p:cSld>
-    <p:bg>
-      <p:bgPr>
-        <a:solidFill>
-          <a:schemeClr val="bg1">
-            <a:tint val="95000"/>
-            <a:satMod val="170000"/>
-          </a:schemeClr>
-        </a:solidFill>
-        <a:effectLst/>
-      </p:bgPr>
-    </p:bg>
-    <p:spTree>
-      <p:nvGrpSpPr>
-        <p:cNvPr id="1" name=""/>
-        <p:cNvGrpSpPr/>
-        <p:nvPr/>
-      </p:nvGrpSpPr>
-      <p:grpSpPr>
-        <a:xfrm>
-          <a:off x="0" y="0"/>
-          <a:ext cx="0" cy="0"/>
-          <a:chOff x="0" y="0"/>
-          <a:chExt cx="0" cy="0"/>
-        </a:xfrm>
-      </p:grpSpPr>
-      <p:sp>
-        <p:nvSpPr>
-          <p:cNvPr id="2" name="Titre 1">
-            <a:extLst>
-              <a:ext uri="{FF2B5EF4-FFF2-40B4-BE49-F238E27FC236}">
-                <a16:creationId xmlns:a16="http://schemas.microsoft.com/office/drawing/2014/main" id="{22446F4D-BFD9-475C-AFB8-F32964871BEE}"/>
-              </a:ext>
-            </a:extLst>
-          </p:cNvPr>
-          <p:cNvSpPr>
-            <a:spLocks noGrp="1"/>
-          </p:cNvSpPr>
-          <p:nvPr>
-            <p:ph type="title"/>
-          </p:nvPr>
-        </p:nvSpPr>
-        <p:spPr>
-          <a:xfrm>
-            <a:off x="420099" y="3225089"/>
-            <a:ext cx="6172782" cy="1325563"/>
-          </a:xfrm>
-        </p:spPr>
-        <p:txBody>
-          <a:bodyPr>
-            <a:normAutofit/>
-          </a:bodyPr>
-          <a:lstStyle/>
-          <a:p>
-            <a:r>
-              <a:rPr lang="fr-FR" dirty="0">
-                <a:hlinkClick r:id="rId2">
-                  <a:extLst>
-                    <a:ext uri="{A12FA001-AC4F-418D-AE19-62706E023703}">
-                      <ahyp:hlinkClr xmlns:ahyp="http://schemas.microsoft.com/office/drawing/2018/hyperlinkcolor" val="tx"/>
-                    </a:ext>
-                  </a:extLst>
-                </a:hlinkClick>
-              </a:rPr>
-              <a:t>Démonstration</a:t>
-            </a:r>
-            <a:endParaRPr lang="fr-FR" dirty="0"/>
-          </a:p>
-        </p:txBody>
-      </p:sp>
-      <p:sp>
-        <p:nvSpPr>
-          <p:cNvPr id="13" name="Freeform: Shape 12">
-            <a:extLst>
-              <a:ext uri="{FF2B5EF4-FFF2-40B4-BE49-F238E27FC236}">
-                <a16:creationId xmlns:a16="http://schemas.microsoft.com/office/drawing/2014/main" id="{4F74D28C-3268-4E35-8EE1-D92CB4A85A7D}"/>
-              </a:ext>
-              <a:ext uri="{C183D7F6-B498-43B3-948B-1728B52AA6E4}">
-                <adec:decorative xmlns:adec="http://schemas.microsoft.com/office/drawing/2017/decorative" val="1"/>
-              </a:ext>
-            </a:extLst>
-          </p:cNvPr>
-          <p:cNvSpPr>
-            <a:spLocks noGrp="1" noRot="1" noChangeAspect="1" noMove="1" noResize="1" noEditPoints="1" noAdjustHandles="1" noChangeArrowheads="1" noChangeShapeType="1" noTextEdit="1"/>
-          </p:cNvSpPr>
-          <p:nvPr>
-            <p:extLst>
-              <p:ext uri="{386F3935-93C4-4BCD-93E2-E3B085C9AB24}">
-                <p16:designElem xmlns:p16="http://schemas.microsoft.com/office/powerpoint/2015/main" val="1"/>
-              </p:ext>
-            </p:extLst>
-          </p:nvPr>
-        </p:nvSpPr>
-        <p:spPr>
-          <a:xfrm>
-            <a:off x="6019218" y="0"/>
-            <a:ext cx="6172782" cy="6858000"/>
-          </a:xfrm>
-          <a:custGeom>
-            <a:avLst/>
-            <a:gdLst>
-              <a:gd name="connsiteX0" fmla="*/ 6172782 w 6172782"/>
-              <a:gd name="connsiteY0" fmla="*/ 0 h 6858000"/>
-              <a:gd name="connsiteX1" fmla="*/ 69075 w 6172782"/>
-              <a:gd name="connsiteY1" fmla="*/ 0 h 6858000"/>
-              <a:gd name="connsiteX2" fmla="*/ 35131 w 6172782"/>
-              <a:gd name="connsiteY2" fmla="*/ 267128 h 6858000"/>
-              <a:gd name="connsiteX3" fmla="*/ 0 w 6172782"/>
-              <a:gd name="connsiteY3" fmla="*/ 962845 h 6858000"/>
-              <a:gd name="connsiteX4" fmla="*/ 3276103 w 6172782"/>
-              <a:gd name="connsiteY4" fmla="*/ 6782205 h 6858000"/>
-              <a:gd name="connsiteX5" fmla="*/ 3407923 w 6172782"/>
-              <a:gd name="connsiteY5" fmla="*/ 6858000 h 6858000"/>
-              <a:gd name="connsiteX6" fmla="*/ 6172782 w 6172782"/>
-              <a:gd name="connsiteY6" fmla="*/ 6858000 h 6858000"/>
-            </a:gdLst>
-            <a:ahLst/>
-            <a:cxnLst>
-              <a:cxn ang="0">
-                <a:pos x="connsiteX0" y="connsiteY0"/>
-              </a:cxn>
-              <a:cxn ang="0">
-                <a:pos x="connsiteX1" y="connsiteY1"/>
-              </a:cxn>
-              <a:cxn ang="0">
-                <a:pos x="connsiteX2" y="connsiteY2"/>
-              </a:cxn>
-              <a:cxn ang="0">
-                <a:pos x="connsiteX3" y="connsiteY3"/>
-              </a:cxn>
-              <a:cxn ang="0">
-                <a:pos x="connsiteX4" y="connsiteY4"/>
-              </a:cxn>
-              <a:cxn ang="0">
-                <a:pos x="connsiteX5" y="connsiteY5"/>
-              </a:cxn>
-              <a:cxn ang="0">
-                <a:pos x="connsiteX6" y="connsiteY6"/>
-              </a:cxn>
-            </a:cxnLst>
-            <a:rect l="l" t="t" r="r" b="b"/>
-            <a:pathLst>
-              <a:path w="6172782" h="6858000">
-                <a:moveTo>
-                  <a:pt x="6172782" y="0"/>
-                </a:moveTo>
-                <a:lnTo>
-                  <a:pt x="69075" y="0"/>
-                </a:lnTo>
-                <a:lnTo>
-                  <a:pt x="35131" y="267128"/>
-                </a:lnTo>
-                <a:cubicBezTo>
-                  <a:pt x="11901" y="495874"/>
-                  <a:pt x="0" y="727970"/>
-                  <a:pt x="0" y="962845"/>
-                </a:cubicBezTo>
-                <a:cubicBezTo>
-                  <a:pt x="0" y="3429034"/>
-                  <a:pt x="1312002" y="5588789"/>
-                  <a:pt x="3276103" y="6782205"/>
-                </a:cubicBezTo>
-                <a:lnTo>
-                  <a:pt x="3407923" y="6858000"/>
-                </a:lnTo>
-                <a:lnTo>
-                  <a:pt x="6172782" y="6858000"/>
-                </a:lnTo>
-                <a:close/>
-              </a:path>
-            </a:pathLst>
-          </a:custGeom>
-          <a:solidFill>
-            <a:srgbClr val="FFFFFF">
-              <a:alpha val="80000"/>
-            </a:srgbClr>
-          </a:solidFill>
-          <a:ln>
-            <a:noFill/>
-          </a:ln>
-        </p:spPr>
-        <p:style>
-          <a:lnRef idx="2">
-            <a:schemeClr val="accent1">
-              <a:shade val="50000"/>
-            </a:schemeClr>
-          </a:lnRef>
-          <a:fillRef idx="1">
-            <a:schemeClr val="accent1"/>
-          </a:fillRef>
-          <a:effectRef idx="0">
-            <a:schemeClr val="accent1"/>
-          </a:effectRef>
-          <a:fontRef idx="minor">
-            <a:schemeClr val="lt1"/>
-          </a:fontRef>
-        </p:style>
-        <p:txBody>
-          <a:bodyPr wrap="square" rtlCol="0" anchor="ctr">
-            <a:noAutofit/>
-          </a:bodyPr>
-          <a:lstStyle/>
-          <a:p>
-            <a:pPr marL="0" marR="0" lvl="0" indent="0" algn="ctr" defTabSz="914400" rtl="0" eaLnBrk="1" fontAlgn="auto" latinLnBrk="0" hangingPunct="1">
-              <a:lnSpc>
-                <a:spcPct val="100000"/>
-              </a:lnSpc>
-              <a:spcBef>
-                <a:spcPts val="0"/>
-              </a:spcBef>
-              <a:spcAft>
-                <a:spcPts val="0"/>
-              </a:spcAft>
-              <a:buClrTx/>
-              <a:buSzTx/>
-              <a:buFontTx/>
-              <a:buNone/>
-              <a:tabLst/>
-              <a:defRPr/>
-            </a:pPr>
-            <a:endParaRPr kumimoji="0" lang="en-US" sz="1800" b="0" i="0" u="none" strike="noStrike" kern="1200" cap="none" spc="0" normalizeH="0" baseline="0" noProof="0">
-              <a:ln>
-                <a:noFill/>
-              </a:ln>
-              <a:solidFill>
-                <a:prstClr val="white"/>
-              </a:solidFill>
-              <a:effectLst/>
-              <a:uLnTx/>
-              <a:uFillTx/>
-              <a:latin typeface="Calibri" panose="020F0502020204030204"/>
-              <a:ea typeface="+mn-ea"/>
-              <a:cs typeface="+mn-cs"/>
-            </a:endParaRPr>
-          </a:p>
-        </p:txBody>
-      </p:sp>
-      <p:pic>
-        <p:nvPicPr>
-          <p:cNvPr id="6" name="Espace réservé du contenu 5">
-            <a:extLst>
-              <a:ext uri="{FF2B5EF4-FFF2-40B4-BE49-F238E27FC236}">
-                <a16:creationId xmlns:a16="http://schemas.microsoft.com/office/drawing/2014/main" id="{EF0B8AF9-6008-4FC1-B03E-AF7F112882EA}"/>
-              </a:ext>
-            </a:extLst>
-          </p:cNvPr>
-          <p:cNvPicPr>
-            <a:picLocks noChangeAspect="1"/>
-          </p:cNvPicPr>
-          <p:nvPr/>
-        </p:nvPicPr>
-        <p:blipFill rotWithShape="1">
           <a:blip r:embed="rId3">
             <a:extLst>
               <a:ext uri="{28A0092B-C50C-407E-A947-70E740481C1C}">
@@ -7892,6 +7057,362 @@
   </p:cSld>
   <p:clrMapOvr>
     <a:overrideClrMapping bg1="dk1" tx1="lt1" bg2="dk2" tx2="lt2" accent1="accent1" accent2="accent2" accent3="accent3" accent4="accent4" accent5="accent5" accent6="accent6" hlink="hlink" folHlink="folHlink"/>
+  </p:clrMapOvr>
+</p:sld>
+</file>
+
+<file path=ppt/slides/slide8.xml><?xml version="1.0" encoding="utf-8"?>
+<p:sld xmlns:a="http://schemas.openxmlformats.org/drawingml/2006/main" xmlns:r="http://schemas.openxmlformats.org/officeDocument/2006/relationships" xmlns:p="http://schemas.openxmlformats.org/presentationml/2006/main">
+  <p:cSld>
+    <p:bg>
+      <p:bgPr>
+        <a:solidFill>
+          <a:schemeClr val="bg1"/>
+        </a:solidFill>
+        <a:effectLst/>
+      </p:bgPr>
+    </p:bg>
+    <p:spTree>
+      <p:nvGrpSpPr>
+        <p:cNvPr id="1" name=""/>
+        <p:cNvGrpSpPr/>
+        <p:nvPr/>
+      </p:nvGrpSpPr>
+      <p:grpSpPr>
+        <a:xfrm>
+          <a:off x="0" y="0"/>
+          <a:ext cx="0" cy="0"/>
+          <a:chOff x="0" y="0"/>
+          <a:chExt cx="0" cy="0"/>
+        </a:xfrm>
+      </p:grpSpPr>
+      <p:pic>
+        <p:nvPicPr>
+          <p:cNvPr id="6" name="Espace réservé du contenu 5">
+            <a:extLst>
+              <a:ext uri="{FF2B5EF4-FFF2-40B4-BE49-F238E27FC236}">
+                <a16:creationId xmlns:a16="http://schemas.microsoft.com/office/drawing/2014/main" id="{0C5BAD85-16AE-4B0A-8D19-2638CA70C242}"/>
+              </a:ext>
+            </a:extLst>
+          </p:cNvPr>
+          <p:cNvPicPr>
+            <a:picLocks noGrp="1" noChangeAspect="1"/>
+          </p:cNvPicPr>
+          <p:nvPr>
+            <p:ph idx="1"/>
+          </p:nvPr>
+        </p:nvPicPr>
+        <p:blipFill>
+          <a:blip r:embed="rId2">
+            <a:extLst>
+              <a:ext uri="{28A0092B-C50C-407E-A947-70E740481C1C}">
+                <a14:useLocalDpi xmlns:a14="http://schemas.microsoft.com/office/drawing/2010/main" val="0"/>
+              </a:ext>
+            </a:extLst>
+          </a:blip>
+          <a:stretch>
+            <a:fillRect/>
+          </a:stretch>
+        </p:blipFill>
+        <p:spPr>
+          <a:xfrm>
+            <a:off x="3239043" y="643466"/>
+            <a:ext cx="5713914" cy="5571067"/>
+          </a:xfrm>
+          <a:prstGeom prst="rect">
+            <a:avLst/>
+          </a:prstGeom>
+        </p:spPr>
+      </p:pic>
+    </p:spTree>
+    <p:extLst>
+      <p:ext uri="{BB962C8B-B14F-4D97-AF65-F5344CB8AC3E}">
+        <p14:creationId xmlns:p14="http://schemas.microsoft.com/office/powerpoint/2010/main" val="3990056866"/>
+      </p:ext>
+    </p:extLst>
+  </p:cSld>
+  <p:clrMapOvr>
+    <a:masterClrMapping/>
+  </p:clrMapOvr>
+</p:sld>
+</file>
+
+<file path=ppt/slides/slide9.xml><?xml version="1.0" encoding="utf-8"?>
+<p:sld xmlns:a="http://schemas.openxmlformats.org/drawingml/2006/main" xmlns:r="http://schemas.openxmlformats.org/officeDocument/2006/relationships" xmlns:p="http://schemas.openxmlformats.org/presentationml/2006/main">
+  <p:cSld>
+    <p:bg>
+      <p:bgPr>
+        <a:solidFill>
+          <a:schemeClr val="bg1"/>
+        </a:solidFill>
+        <a:effectLst/>
+      </p:bgPr>
+    </p:bg>
+    <p:spTree>
+      <p:nvGrpSpPr>
+        <p:cNvPr id="1" name=""/>
+        <p:cNvGrpSpPr/>
+        <p:nvPr/>
+      </p:nvGrpSpPr>
+      <p:grpSpPr>
+        <a:xfrm>
+          <a:off x="0" y="0"/>
+          <a:ext cx="0" cy="0"/>
+          <a:chOff x="0" y="0"/>
+          <a:chExt cx="0" cy="0"/>
+        </a:xfrm>
+      </p:grpSpPr>
+      <p:sp>
+        <p:nvSpPr>
+          <p:cNvPr id="4" name="Rectangle 3">
+            <a:extLst>
+              <a:ext uri="{FF2B5EF4-FFF2-40B4-BE49-F238E27FC236}">
+                <a16:creationId xmlns:a16="http://schemas.microsoft.com/office/drawing/2014/main" id="{4DD5D21D-F3EA-445D-AADB-6D03693C87C0}"/>
+              </a:ext>
+            </a:extLst>
+          </p:cNvPr>
+          <p:cNvSpPr/>
+          <p:nvPr/>
+        </p:nvSpPr>
+        <p:spPr>
+          <a:xfrm>
+            <a:off x="457200" y="314325"/>
+            <a:ext cx="11277600" cy="6229350"/>
+          </a:xfrm>
+          <a:prstGeom prst="rect">
+            <a:avLst/>
+          </a:prstGeom>
+          <a:noFill/>
+          <a:ln>
+            <a:solidFill>
+              <a:schemeClr val="tx1"/>
+            </a:solidFill>
+          </a:ln>
+        </p:spPr>
+        <p:style>
+          <a:lnRef idx="2">
+            <a:schemeClr val="accent1">
+              <a:shade val="50000"/>
+            </a:schemeClr>
+          </a:lnRef>
+          <a:fillRef idx="1">
+            <a:schemeClr val="accent1"/>
+          </a:fillRef>
+          <a:effectRef idx="0">
+            <a:schemeClr val="accent1"/>
+          </a:effectRef>
+          <a:fontRef idx="minor">
+            <a:schemeClr val="lt1"/>
+          </a:fontRef>
+        </p:style>
+        <p:txBody>
+          <a:bodyPr rtlCol="0" anchor="ctr"/>
+          <a:lstStyle/>
+          <a:p>
+            <a:pPr algn="ctr"/>
+            <a:endParaRPr lang="fr-CA"/>
+          </a:p>
+        </p:txBody>
+      </p:sp>
+      <p:sp>
+        <p:nvSpPr>
+          <p:cNvPr id="5" name="Rectangle 4">
+            <a:extLst>
+              <a:ext uri="{FF2B5EF4-FFF2-40B4-BE49-F238E27FC236}">
+                <a16:creationId xmlns:a16="http://schemas.microsoft.com/office/drawing/2014/main" id="{F2252435-55BF-4212-AFD5-F140C9B01DE8}"/>
+              </a:ext>
+            </a:extLst>
+          </p:cNvPr>
+          <p:cNvSpPr/>
+          <p:nvPr/>
+        </p:nvSpPr>
+        <p:spPr>
+          <a:xfrm>
+            <a:off x="457200" y="314325"/>
+            <a:ext cx="11277600" cy="733425"/>
+          </a:xfrm>
+          <a:prstGeom prst="rect">
+            <a:avLst/>
+          </a:prstGeom>
+          <a:noFill/>
+          <a:ln>
+            <a:solidFill>
+              <a:schemeClr val="tx1"/>
+            </a:solidFill>
+          </a:ln>
+        </p:spPr>
+        <p:style>
+          <a:lnRef idx="2">
+            <a:schemeClr val="accent1">
+              <a:shade val="50000"/>
+            </a:schemeClr>
+          </a:lnRef>
+          <a:fillRef idx="1">
+            <a:schemeClr val="accent1"/>
+          </a:fillRef>
+          <a:effectRef idx="0">
+            <a:schemeClr val="accent1"/>
+          </a:effectRef>
+          <a:fontRef idx="minor">
+            <a:schemeClr val="lt1"/>
+          </a:fontRef>
+        </p:style>
+        <p:txBody>
+          <a:bodyPr rtlCol="0" anchor="ctr"/>
+          <a:lstStyle/>
+          <a:p>
+            <a:pPr algn="ctr"/>
+            <a:endParaRPr lang="fr-CA" dirty="0"/>
+          </a:p>
+        </p:txBody>
+      </p:sp>
+      <p:sp>
+        <p:nvSpPr>
+          <p:cNvPr id="7" name="ZoneTexte 6">
+            <a:extLst>
+              <a:ext uri="{FF2B5EF4-FFF2-40B4-BE49-F238E27FC236}">
+                <a16:creationId xmlns:a16="http://schemas.microsoft.com/office/drawing/2014/main" id="{D700CEFB-9D8C-4C37-93C9-A9B38A0C1EEE}"/>
+              </a:ext>
+            </a:extLst>
+          </p:cNvPr>
+          <p:cNvSpPr txBox="1"/>
+          <p:nvPr/>
+        </p:nvSpPr>
+        <p:spPr>
+          <a:xfrm>
+            <a:off x="4848224" y="496371"/>
+            <a:ext cx="2495551" cy="369332"/>
+          </a:xfrm>
+          <a:prstGeom prst="rect">
+            <a:avLst/>
+          </a:prstGeom>
+          <a:noFill/>
+        </p:spPr>
+        <p:txBody>
+          <a:bodyPr wrap="square" rtlCol="0">
+            <a:spAutoFit/>
+          </a:bodyPr>
+          <a:lstStyle/>
+          <a:p>
+            <a:r>
+              <a:rPr lang="en-CA" dirty="0"/>
+              <a:t>Consultation des </a:t>
+            </a:r>
+            <a:r>
+              <a:rPr lang="en-CA" dirty="0" err="1"/>
+              <a:t>bouées</a:t>
+            </a:r>
+            <a:endParaRPr lang="fr-CA" dirty="0"/>
+          </a:p>
+        </p:txBody>
+      </p:sp>
+      <p:pic>
+        <p:nvPicPr>
+          <p:cNvPr id="1026" name="Picture 2" descr="Résultats de recherche d'images pour « logo home »">
+            <a:extLst>
+              <a:ext uri="{FF2B5EF4-FFF2-40B4-BE49-F238E27FC236}">
+                <a16:creationId xmlns:a16="http://schemas.microsoft.com/office/drawing/2014/main" id="{BE53146C-6811-450E-B394-6EF28ABF8786}"/>
+              </a:ext>
+            </a:extLst>
+          </p:cNvPr>
+          <p:cNvPicPr>
+            <a:picLocks noChangeAspect="1" noChangeArrowheads="1"/>
+          </p:cNvPicPr>
+          <p:nvPr/>
+        </p:nvPicPr>
+        <p:blipFill rotWithShape="1">
+          <a:blip r:embed="rId2">
+            <a:extLst>
+              <a:ext uri="{28A0092B-C50C-407E-A947-70E740481C1C}">
+                <a14:useLocalDpi xmlns:a14="http://schemas.microsoft.com/office/drawing/2010/main" val="0"/>
+              </a:ext>
+            </a:extLst>
+          </a:blip>
+          <a:srcRect l="15254" t="12995" r="14689" b="14124"/>
+          <a:stretch/>
+        </p:blipFill>
+        <p:spPr bwMode="auto">
+          <a:xfrm>
+            <a:off x="933450" y="403583"/>
+            <a:ext cx="533400" cy="554908"/>
+          </a:xfrm>
+          <a:prstGeom prst="rect">
+            <a:avLst/>
+          </a:prstGeom>
+          <a:noFill/>
+          <a:extLst>
+            <a:ext uri="{909E8E84-426E-40DD-AFC4-6F175D3DCCD1}">
+              <a14:hiddenFill xmlns:a14="http://schemas.microsoft.com/office/drawing/2010/main">
+                <a:solidFill>
+                  <a:srgbClr val="FFFFFF"/>
+                </a:solidFill>
+              </a14:hiddenFill>
+            </a:ext>
+          </a:extLst>
+        </p:spPr>
+      </p:pic>
+      <p:sp>
+        <p:nvSpPr>
+          <p:cNvPr id="9" name="Bouton d’action : vide 8">
+            <a:hlinkClick r:id="rId3" action="ppaction://hlinksldjump" highlightClick="1"/>
+            <a:extLst>
+              <a:ext uri="{FF2B5EF4-FFF2-40B4-BE49-F238E27FC236}">
+                <a16:creationId xmlns:a16="http://schemas.microsoft.com/office/drawing/2014/main" id="{FC930852-8F4B-4280-9AA8-7D8ADB87FEF9}"/>
+              </a:ext>
+            </a:extLst>
+          </p:cNvPr>
+          <p:cNvSpPr/>
+          <p:nvPr/>
+        </p:nvSpPr>
+        <p:spPr>
+          <a:xfrm>
+            <a:off x="0" y="5295900"/>
+            <a:ext cx="361950" cy="1562100"/>
+          </a:xfrm>
+          <a:prstGeom prst="actionButtonBlank">
+            <a:avLst/>
+          </a:prstGeom>
+          <a:noFill/>
+          <a:ln>
+            <a:solidFill>
+              <a:schemeClr val="bg1"/>
+            </a:solidFill>
+          </a:ln>
+        </p:spPr>
+        <p:style>
+          <a:lnRef idx="2">
+            <a:schemeClr val="accent1">
+              <a:shade val="50000"/>
+            </a:schemeClr>
+          </a:lnRef>
+          <a:fillRef idx="1">
+            <a:schemeClr val="accent1"/>
+          </a:fillRef>
+          <a:effectRef idx="0">
+            <a:schemeClr val="accent1"/>
+          </a:effectRef>
+          <a:fontRef idx="minor">
+            <a:schemeClr val="lt1"/>
+          </a:fontRef>
+        </p:style>
+        <p:txBody>
+          <a:bodyPr rtlCol="0" anchor="ctr"/>
+          <a:lstStyle/>
+          <a:p>
+            <a:pPr algn="ctr"/>
+            <a:endParaRPr lang="fr-CA" dirty="0"/>
+          </a:p>
+        </p:txBody>
+      </p:sp>
+    </p:spTree>
+    <p:extLst>
+      <p:ext uri="{BB962C8B-B14F-4D97-AF65-F5344CB8AC3E}">
+        <p14:creationId xmlns:p14="http://schemas.microsoft.com/office/powerpoint/2010/main" val="1086254278"/>
+      </p:ext>
+    </p:extLst>
+  </p:cSld>
+  <p:clrMapOvr>
+    <a:masterClrMapping/>
   </p:clrMapOvr>
 </p:sld>
 </file>

</xml_diff>